<commit_message>
correct typo in exam location
</commit_message>
<xml_diff>
--- a/lectures/lecture1/overview.pptx
+++ b/lectures/lecture1/overview.pptx
@@ -302,7 +302,7 @@
           <a:p>
             <a:fld id="{0DBCF7F0-66B2-E246-9655-E9BA5C294290}" type="datetimeFigureOut">
               <a:rPr lang="en-US" smtClean="0"/>
-              <a:t>2/8/17</a:t>
+              <a:t>3/3/17</a:t>
             </a:fld>
             <a:endParaRPr lang="en-US"/>
           </a:p>
@@ -472,7 +472,7 @@
           <a:p>
             <a:fld id="{0DBCF7F0-66B2-E246-9655-E9BA5C294290}" type="datetimeFigureOut">
               <a:rPr lang="en-US" smtClean="0"/>
-              <a:t>2/8/17</a:t>
+              <a:t>3/3/17</a:t>
             </a:fld>
             <a:endParaRPr lang="en-US"/>
           </a:p>
@@ -652,7 +652,7 @@
           <a:p>
             <a:fld id="{0DBCF7F0-66B2-E246-9655-E9BA5C294290}" type="datetimeFigureOut">
               <a:rPr lang="en-US" smtClean="0"/>
-              <a:t>2/8/17</a:t>
+              <a:t>3/3/17</a:t>
             </a:fld>
             <a:endParaRPr lang="en-US"/>
           </a:p>
@@ -822,7 +822,7 @@
           <a:p>
             <a:fld id="{0DBCF7F0-66B2-E246-9655-E9BA5C294290}" type="datetimeFigureOut">
               <a:rPr lang="en-US" smtClean="0"/>
-              <a:t>2/8/17</a:t>
+              <a:t>3/3/17</a:t>
             </a:fld>
             <a:endParaRPr lang="en-US"/>
           </a:p>
@@ -1068,7 +1068,7 @@
           <a:p>
             <a:fld id="{0DBCF7F0-66B2-E246-9655-E9BA5C294290}" type="datetimeFigureOut">
               <a:rPr lang="en-US" smtClean="0"/>
-              <a:t>2/8/17</a:t>
+              <a:t>3/3/17</a:t>
             </a:fld>
             <a:endParaRPr lang="en-US"/>
           </a:p>
@@ -1356,7 +1356,7 @@
           <a:p>
             <a:fld id="{0DBCF7F0-66B2-E246-9655-E9BA5C294290}" type="datetimeFigureOut">
               <a:rPr lang="en-US" smtClean="0"/>
-              <a:t>2/8/17</a:t>
+              <a:t>3/3/17</a:t>
             </a:fld>
             <a:endParaRPr lang="en-US"/>
           </a:p>
@@ -1778,7 +1778,7 @@
           <a:p>
             <a:fld id="{0DBCF7F0-66B2-E246-9655-E9BA5C294290}" type="datetimeFigureOut">
               <a:rPr lang="en-US" smtClean="0"/>
-              <a:t>2/8/17</a:t>
+              <a:t>3/3/17</a:t>
             </a:fld>
             <a:endParaRPr lang="en-US"/>
           </a:p>
@@ -1896,7 +1896,7 @@
           <a:p>
             <a:fld id="{0DBCF7F0-66B2-E246-9655-E9BA5C294290}" type="datetimeFigureOut">
               <a:rPr lang="en-US" smtClean="0"/>
-              <a:t>2/8/17</a:t>
+              <a:t>3/3/17</a:t>
             </a:fld>
             <a:endParaRPr lang="en-US"/>
           </a:p>
@@ -1991,7 +1991,7 @@
           <a:p>
             <a:fld id="{0DBCF7F0-66B2-E246-9655-E9BA5C294290}" type="datetimeFigureOut">
               <a:rPr lang="en-US" smtClean="0"/>
-              <a:t>2/8/17</a:t>
+              <a:t>3/3/17</a:t>
             </a:fld>
             <a:endParaRPr lang="en-US"/>
           </a:p>
@@ -2268,7 +2268,7 @@
           <a:p>
             <a:fld id="{0DBCF7F0-66B2-E246-9655-E9BA5C294290}" type="datetimeFigureOut">
               <a:rPr lang="en-US" smtClean="0"/>
-              <a:t>2/8/17</a:t>
+              <a:t>3/3/17</a:t>
             </a:fld>
             <a:endParaRPr lang="en-US"/>
           </a:p>
@@ -2521,7 +2521,7 @@
           <a:p>
             <a:fld id="{0DBCF7F0-66B2-E246-9655-E9BA5C294290}" type="datetimeFigureOut">
               <a:rPr lang="en-US" smtClean="0"/>
-              <a:t>2/8/17</a:t>
+              <a:t>3/3/17</a:t>
             </a:fld>
             <a:endParaRPr lang="en-US"/>
           </a:p>
@@ -2734,7 +2734,7 @@
           <a:p>
             <a:fld id="{0DBCF7F0-66B2-E246-9655-E9BA5C294290}" type="datetimeFigureOut">
               <a:rPr lang="en-US" smtClean="0"/>
-              <a:t>2/8/17</a:t>
+              <a:t>3/3/17</a:t>
             </a:fld>
             <a:endParaRPr lang="en-US"/>
           </a:p>
@@ -4723,7 +4723,7 @@
           <a:graphicData uri="http://schemas.openxmlformats.org/presentationml/2006/ole">
             <mc:AlternateContent xmlns:mc="http://schemas.openxmlformats.org/markup-compatibility/2006">
               <mc:Choice xmlns:v="urn:schemas-microsoft-com:vml" Requires="v">
-                <p:oleObj spid="_x0000_s4121" name="Equation" r:id="rId3" imgW="520700" imgH="228600" progId="Equation.3">
+                <p:oleObj spid="_x0000_s4123" name="Equation" r:id="rId3" imgW="520700" imgH="228600" progId="Equation.3">
                   <p:embed/>
                 </p:oleObj>
               </mc:Choice>
@@ -5203,21 +5203,8 @@
                   <a:srgbClr val="3366FF"/>
                 </a:solidFill>
               </a:rPr>
-              <a:t>pencil-and-</a:t>
-            </a:r>
-            <a:r>
-              <a:rPr lang="en-US" sz="2800" dirty="0" smtClean="0">
-                <a:solidFill>
-                  <a:srgbClr val="3366FF"/>
-                </a:solidFill>
-              </a:rPr>
-              <a:t>paper</a:t>
-            </a:r>
-            <a:endParaRPr lang="en-US" sz="2800" dirty="0" smtClean="0">
-              <a:solidFill>
-                <a:srgbClr val="3366FF"/>
-              </a:solidFill>
-            </a:endParaRPr>
+              <a:t>pencil-and-paper</a:t>
+            </a:r>
           </a:p>
         </p:txBody>
       </p:sp>
@@ -5356,11 +5343,6 @@
               </a:rPr>
               <a:t>no puppies</a:t>
             </a:r>
-            <a:endParaRPr lang="en-US" sz="2800" dirty="0">
-              <a:solidFill>
-                <a:srgbClr val="3366FF"/>
-              </a:solidFill>
-            </a:endParaRPr>
           </a:p>
         </p:txBody>
       </p:sp>
@@ -6155,7 +6137,19 @@
             </a:r>
             <a:r>
               <a:rPr lang="en-US" sz="2000" dirty="0" smtClean="0"/>
-              <a:t>(3/3, 4/10, &amp; 5/5 in 54-340), </a:t>
+              <a:t>(3/3, 4/10, &amp; 5/5 </a:t>
+            </a:r>
+            <a:r>
+              <a:rPr lang="en-US" sz="2000" smtClean="0"/>
+              <a:t>in </a:t>
+            </a:r>
+            <a:r>
+              <a:rPr lang="en-US" sz="2000" smtClean="0"/>
+              <a:t>50-</a:t>
+            </a:r>
+            <a:r>
+              <a:rPr lang="en-US" sz="2000" dirty="0" smtClean="0"/>
+              <a:t>340), </a:t>
             </a:r>
             <a:r>
               <a:rPr lang="en-US" sz="2000" dirty="0" smtClean="0">
@@ -6620,7 +6614,7 @@
           <a:graphicData uri="http://schemas.openxmlformats.org/presentationml/2006/ole">
             <mc:AlternateContent xmlns:mc="http://schemas.openxmlformats.org/markup-compatibility/2006">
               <mc:Choice xmlns:v="urn:schemas-microsoft-com:vml" Requires="v">
-                <p:oleObj spid="_x0000_s1089" name="Equation" r:id="rId3" imgW="1282700" imgH="685800" progId="Equation.3">
+                <p:oleObj spid="_x0000_s1092" name="Equation" r:id="rId3" imgW="1282700" imgH="685800" progId="Equation.3">
                   <p:embed/>
                 </p:oleObj>
               </mc:Choice>
@@ -6868,7 +6862,7 @@
           <a:graphicData uri="http://schemas.openxmlformats.org/presentationml/2006/ole">
             <mc:AlternateContent xmlns:mc="http://schemas.openxmlformats.org/markup-compatibility/2006">
               <mc:Choice xmlns:v="urn:schemas-microsoft-com:vml" Requires="v">
-                <p:oleObj spid="_x0000_s1090" name="Equation" r:id="rId5" imgW="2082800" imgH="812800" progId="Equation.3">
+                <p:oleObj spid="_x0000_s1093" name="Equation" r:id="rId5" imgW="2082800" imgH="812800" progId="Equation.3">
                   <p:embed/>
                 </p:oleObj>
               </mc:Choice>
@@ -7610,7 +7604,7 @@
           <a:graphicData uri="http://schemas.openxmlformats.org/presentationml/2006/ole">
             <mc:AlternateContent xmlns:mc="http://schemas.openxmlformats.org/markup-compatibility/2006">
               <mc:Choice xmlns:v="urn:schemas-microsoft-com:vml" Requires="v">
-                <p:oleObj spid="_x0000_s3104" name="Equation" r:id="rId3" imgW="2082800" imgH="812800" progId="Equation.3">
+                <p:oleObj spid="_x0000_s3106" name="Equation" r:id="rId3" imgW="2082800" imgH="812800" progId="Equation.3">
                   <p:embed/>
                 </p:oleObj>
               </mc:Choice>

</xml_diff>